<commit_message>
add mengekstrak elemen-elemen list dan menampungnya ke dalam variabel
</commit_message>
<xml_diff>
--- a/list/List python.pptx
+++ b/list/List python.pptx
@@ -7,6 +7,7 @@
   <p:sldIdLst>
     <p:sldId id="260" r:id="rId2"/>
     <p:sldId id="261" r:id="rId3"/>
+    <p:sldId id="262" r:id="rId4"/>
   </p:sldIdLst>
   <p:sldSz cx="12192000" cy="6858000"/>
   <p:notesSz cx="6858000" cy="9144000"/>
@@ -4248,6 +4249,557 @@
 </p:sld>
 </file>
 
+<file path=ppt/slides/slide3.xml><?xml version="1.0" encoding="utf-8"?>
+<p:sld xmlns:a="http://schemas.openxmlformats.org/drawingml/2006/main" xmlns:r="http://schemas.openxmlformats.org/officeDocument/2006/relationships" xmlns:p="http://schemas.openxmlformats.org/presentationml/2006/main">
+  <p:cSld>
+    <p:spTree>
+      <p:nvGrpSpPr>
+        <p:cNvPr id="1" name=""/>
+        <p:cNvGrpSpPr/>
+        <p:nvPr/>
+      </p:nvGrpSpPr>
+      <p:grpSpPr>
+        <a:xfrm>
+          <a:off x="0" y="0"/>
+          <a:ext cx="0" cy="0"/>
+          <a:chOff x="0" y="0"/>
+          <a:chExt cx="0" cy="0"/>
+        </a:xfrm>
+      </p:grpSpPr>
+      <p:sp>
+        <p:nvSpPr>
+          <p:cNvPr id="2" name="Title 1">
+            <a:extLst>
+              <a:ext uri="{FF2B5EF4-FFF2-40B4-BE49-F238E27FC236}">
+                <a16:creationId xmlns:a16="http://schemas.microsoft.com/office/drawing/2014/main" id="{19050FC1-1597-430F-A331-8CC3201292DB}"/>
+              </a:ext>
+            </a:extLst>
+          </p:cNvPr>
+          <p:cNvSpPr>
+            <a:spLocks noGrp="1"/>
+          </p:cNvSpPr>
+          <p:nvPr>
+            <p:ph type="title"/>
+          </p:nvPr>
+        </p:nvSpPr>
+        <p:spPr>
+          <a:xfrm>
+            <a:off x="400929" y="280682"/>
+            <a:ext cx="11226018" cy="1325563"/>
+          </a:xfrm>
+        </p:spPr>
+        <p:txBody>
+          <a:bodyPr>
+            <a:noAutofit/>
+          </a:bodyPr>
+          <a:lstStyle/>
+          <a:p>
+            <a:r>
+              <a:rPr lang="en-US" sz="5500" b="1" dirty="0" err="1"/>
+              <a:t>Mengekstrak</a:t>
+            </a:r>
+            <a:r>
+              <a:rPr lang="en-US" sz="5500" b="1" dirty="0"/>
+              <a:t> </a:t>
+            </a:r>
+            <a:r>
+              <a:rPr lang="en-US" sz="5500" b="1" dirty="0" err="1"/>
+              <a:t>elemen-elemen</a:t>
+            </a:r>
+            <a:r>
+              <a:rPr lang="en-US" sz="5500" b="1" dirty="0"/>
+              <a:t> List dan </a:t>
+            </a:r>
+            <a:r>
+              <a:rPr lang="en-US" sz="5500" b="1" dirty="0" err="1"/>
+              <a:t>menampungnya</a:t>
+            </a:r>
+            <a:r>
+              <a:rPr lang="en-US" sz="5500" b="1" dirty="0"/>
+              <a:t> </a:t>
+            </a:r>
+            <a:r>
+              <a:rPr lang="en-US" sz="5500" b="1" dirty="0" err="1"/>
+              <a:t>ke</a:t>
+            </a:r>
+            <a:r>
+              <a:rPr lang="en-US" sz="5500" b="1" dirty="0"/>
+              <a:t> </a:t>
+            </a:r>
+            <a:r>
+              <a:rPr lang="en-US" sz="5500" b="1" dirty="0" err="1"/>
+              <a:t>dalam</a:t>
+            </a:r>
+            <a:r>
+              <a:rPr lang="en-US" sz="5500" b="1" dirty="0"/>
+              <a:t> </a:t>
+            </a:r>
+            <a:r>
+              <a:rPr lang="en-US" sz="5500" b="1" dirty="0" err="1"/>
+              <a:t>variabel</a:t>
+            </a:r>
+            <a:endParaRPr lang="en-GB" sz="5500" b="1" dirty="0"/>
+          </a:p>
+        </p:txBody>
+      </p:sp>
+      <p:pic>
+        <p:nvPicPr>
+          <p:cNvPr id="5" name="Picture 4">
+            <a:extLst>
+              <a:ext uri="{FF2B5EF4-FFF2-40B4-BE49-F238E27FC236}">
+                <a16:creationId xmlns:a16="http://schemas.microsoft.com/office/drawing/2014/main" id="{ABA73888-7326-41B6-85EC-C3528AF9C4AE}"/>
+              </a:ext>
+            </a:extLst>
+          </p:cNvPr>
+          <p:cNvPicPr>
+            <a:picLocks noChangeAspect="1"/>
+          </p:cNvPicPr>
+          <p:nvPr/>
+        </p:nvPicPr>
+        <p:blipFill>
+          <a:blip r:embed="rId2">
+            <a:extLst>
+              <a:ext uri="{28A0092B-C50C-407E-A947-70E740481C1C}">
+                <a14:useLocalDpi xmlns:a14="http://schemas.microsoft.com/office/drawing/2010/main" val="0"/>
+              </a:ext>
+            </a:extLst>
+          </a:blip>
+          <a:stretch>
+            <a:fillRect/>
+          </a:stretch>
+        </p:blipFill>
+        <p:spPr>
+          <a:xfrm>
+            <a:off x="9045526" y="1606245"/>
+            <a:ext cx="2161941" cy="2153529"/>
+          </a:xfrm>
+          <a:prstGeom prst="rect">
+            <a:avLst/>
+          </a:prstGeom>
+        </p:spPr>
+      </p:pic>
+      <p:sp>
+        <p:nvSpPr>
+          <p:cNvPr id="6" name="TextBox 5">
+            <a:extLst>
+              <a:ext uri="{FF2B5EF4-FFF2-40B4-BE49-F238E27FC236}">
+                <a16:creationId xmlns:a16="http://schemas.microsoft.com/office/drawing/2014/main" id="{3972628B-56F3-4B3B-BDC2-B1A38F34CE67}"/>
+              </a:ext>
+            </a:extLst>
+          </p:cNvPr>
+          <p:cNvSpPr txBox="1"/>
+          <p:nvPr/>
+        </p:nvSpPr>
+        <p:spPr>
+          <a:xfrm>
+            <a:off x="1324913" y="2051614"/>
+            <a:ext cx="7301133" cy="3970318"/>
+          </a:xfrm>
+          <a:prstGeom prst="rect">
+            <a:avLst/>
+          </a:prstGeom>
+          <a:noFill/>
+        </p:spPr>
+        <p:txBody>
+          <a:bodyPr wrap="square" rtlCol="0">
+            <a:spAutoFit/>
+          </a:bodyPr>
+          <a:lstStyle/>
+          <a:p>
+            <a:r>
+              <a:rPr lang="en-GB" sz="3600" b="1" i="0" dirty="0" err="1">
+                <a:solidFill>
+                  <a:srgbClr val="FF0000"/>
+                </a:solidFill>
+                <a:effectLst/>
+                <a:latin typeface="Jost"/>
+              </a:rPr>
+              <a:t>Masalah</a:t>
+            </a:r>
+            <a:r>
+              <a:rPr lang="en-GB" sz="3600" b="1" i="0" dirty="0">
+                <a:solidFill>
+                  <a:srgbClr val="FF0000"/>
+                </a:solidFill>
+                <a:effectLst/>
+                <a:latin typeface="Jost"/>
+              </a:rPr>
+              <a:t> : </a:t>
+            </a:r>
+            <a:r>
+              <a:rPr lang="en-GB" sz="3600" b="1" i="0" dirty="0">
+                <a:effectLst/>
+                <a:latin typeface="Jost"/>
+              </a:rPr>
+              <a:t>Anda </a:t>
+            </a:r>
+            <a:r>
+              <a:rPr lang="en-GB" sz="3600" b="1" i="0" dirty="0" err="1">
+                <a:effectLst/>
+                <a:latin typeface="Jost"/>
+              </a:rPr>
+              <a:t>memiliki</a:t>
+            </a:r>
+            <a:r>
+              <a:rPr lang="en-GB" sz="3600" b="1" i="0" dirty="0">
+                <a:effectLst/>
+                <a:latin typeface="Jost"/>
+              </a:rPr>
+              <a:t> list yang </a:t>
+            </a:r>
+            <a:r>
+              <a:rPr lang="en-GB" sz="3600" b="1" i="0" dirty="0" err="1">
+                <a:effectLst/>
+                <a:latin typeface="Jost"/>
+              </a:rPr>
+              <a:t>jumlah</a:t>
+            </a:r>
+            <a:r>
+              <a:rPr lang="en-GB" sz="3600" b="1" i="0" dirty="0">
+                <a:effectLst/>
+                <a:latin typeface="Jost"/>
+              </a:rPr>
+              <a:t> </a:t>
+            </a:r>
+            <a:r>
+              <a:rPr lang="en-GB" sz="3600" b="1" i="0" dirty="0" err="1">
+                <a:effectLst/>
+                <a:latin typeface="Jost"/>
+              </a:rPr>
+              <a:t>elemen</a:t>
+            </a:r>
+            <a:r>
+              <a:rPr lang="en-GB" sz="3600" b="1" i="0" dirty="0">
+                <a:effectLst/>
+                <a:latin typeface="Jost"/>
+              </a:rPr>
+              <a:t> </a:t>
+            </a:r>
+            <a:r>
+              <a:rPr lang="en-GB" sz="3600" b="1" i="0" dirty="0" err="1">
+                <a:effectLst/>
+                <a:latin typeface="Jost"/>
+              </a:rPr>
+              <a:t>nya</a:t>
+            </a:r>
+            <a:r>
+              <a:rPr lang="en-GB" sz="3600" b="1" i="0" dirty="0">
+                <a:effectLst/>
+                <a:latin typeface="Jost"/>
+              </a:rPr>
+              <a:t> </a:t>
+            </a:r>
+            <a:r>
+              <a:rPr lang="en-GB" sz="3600" b="1" i="0" dirty="0" err="1">
+                <a:effectLst/>
+                <a:latin typeface="Jost"/>
+              </a:rPr>
+              <a:t>sedikit</a:t>
+            </a:r>
+            <a:r>
+              <a:rPr lang="en-GB" sz="3600" b="1" i="0" dirty="0">
+                <a:effectLst/>
+                <a:latin typeface="Jost"/>
+              </a:rPr>
+              <a:t> (</a:t>
+            </a:r>
+            <a:r>
+              <a:rPr lang="en-GB" sz="3600" b="1" i="0" dirty="0" err="1">
+                <a:effectLst/>
+                <a:latin typeface="Jost"/>
+              </a:rPr>
+              <a:t>misalnya</a:t>
+            </a:r>
+            <a:r>
+              <a:rPr lang="en-GB" sz="3600" b="1" i="0" dirty="0">
+                <a:effectLst/>
+                <a:latin typeface="Jost"/>
+              </a:rPr>
+              <a:t> </a:t>
+            </a:r>
+            <a:r>
+              <a:rPr lang="en-GB" sz="3600" b="1" i="0" dirty="0" err="1">
+                <a:effectLst/>
+                <a:latin typeface="Jost"/>
+              </a:rPr>
+              <a:t>kurang</a:t>
+            </a:r>
+            <a:r>
+              <a:rPr lang="en-GB" sz="3600" b="1" i="0" dirty="0">
+                <a:effectLst/>
+                <a:latin typeface="Jost"/>
+              </a:rPr>
+              <a:t> </a:t>
+            </a:r>
+            <a:r>
+              <a:rPr lang="en-GB" sz="3600" b="1" i="0" dirty="0" err="1">
+                <a:effectLst/>
+                <a:latin typeface="Jost"/>
+              </a:rPr>
+              <a:t>dari</a:t>
+            </a:r>
+            <a:r>
+              <a:rPr lang="en-GB" sz="3600" b="1" i="0" dirty="0">
+                <a:effectLst/>
+                <a:latin typeface="Jost"/>
+              </a:rPr>
+              <a:t> </a:t>
+            </a:r>
+            <a:r>
+              <a:rPr lang="en-GB" sz="3600" b="1" i="0" dirty="0" err="1">
+                <a:effectLst/>
+                <a:latin typeface="Jost"/>
+              </a:rPr>
+              <a:t>atau</a:t>
+            </a:r>
+            <a:r>
+              <a:rPr lang="en-GB" sz="3600" b="1" i="0" dirty="0">
+                <a:effectLst/>
+                <a:latin typeface="Jost"/>
+              </a:rPr>
+              <a:t> </a:t>
+            </a:r>
+            <a:r>
+              <a:rPr lang="en-GB" sz="3600" b="1" i="0" dirty="0" err="1">
+                <a:effectLst/>
+                <a:latin typeface="Jost"/>
+              </a:rPr>
+              <a:t>sama</a:t>
+            </a:r>
+            <a:r>
+              <a:rPr lang="en-GB" sz="3600" b="1" i="0" dirty="0">
+                <a:effectLst/>
+                <a:latin typeface="Jost"/>
+              </a:rPr>
+              <a:t> </a:t>
+            </a:r>
+            <a:r>
+              <a:rPr lang="en-GB" sz="3600" b="1" i="0" dirty="0" err="1">
+                <a:effectLst/>
+                <a:latin typeface="Jost"/>
+              </a:rPr>
+              <a:t>dengan</a:t>
+            </a:r>
+            <a:r>
+              <a:rPr lang="en-GB" sz="3600" b="1" i="0" dirty="0">
+                <a:effectLst/>
+                <a:latin typeface="Jost"/>
+              </a:rPr>
+              <a:t> 5), </a:t>
+            </a:r>
+            <a:r>
+              <a:rPr lang="en-GB" sz="3600" b="1" i="0" dirty="0" err="1">
+                <a:effectLst/>
+                <a:latin typeface="Jost"/>
+              </a:rPr>
+              <a:t>kemudian</a:t>
+            </a:r>
+            <a:r>
+              <a:rPr lang="en-GB" sz="3600" b="1" i="0" dirty="0">
+                <a:effectLst/>
+                <a:latin typeface="Jost"/>
+              </a:rPr>
+              <a:t> </a:t>
+            </a:r>
+            <a:r>
+              <a:rPr lang="en-GB" sz="3600" b="1" i="0" dirty="0" err="1">
+                <a:effectLst/>
+                <a:latin typeface="Jost"/>
+              </a:rPr>
+              <a:t>anda</a:t>
+            </a:r>
+            <a:r>
+              <a:rPr lang="en-GB" sz="3600" b="1" i="0" dirty="0">
+                <a:effectLst/>
+                <a:latin typeface="Jost"/>
+              </a:rPr>
+              <a:t> </a:t>
+            </a:r>
+            <a:r>
+              <a:rPr lang="en-GB" sz="3600" b="1" i="0" dirty="0" err="1">
+                <a:effectLst/>
+                <a:latin typeface="Jost"/>
+              </a:rPr>
+              <a:t>ingin</a:t>
+            </a:r>
+            <a:r>
+              <a:rPr lang="en-GB" sz="3600" b="1" i="0" dirty="0">
+                <a:effectLst/>
+                <a:latin typeface="Jost"/>
+              </a:rPr>
+              <a:t> </a:t>
+            </a:r>
+            <a:r>
+              <a:rPr lang="en-GB" sz="3600" b="1" i="0" dirty="0" err="1">
+                <a:effectLst/>
+                <a:latin typeface="Jost"/>
+              </a:rPr>
+              <a:t>mengeksrak</a:t>
+            </a:r>
+            <a:r>
+              <a:rPr lang="en-GB" sz="3600" b="1" i="0" dirty="0">
+                <a:effectLst/>
+                <a:latin typeface="Jost"/>
+              </a:rPr>
+              <a:t> </a:t>
+            </a:r>
+            <a:r>
+              <a:rPr lang="en-GB" sz="3600" b="1" i="0" dirty="0" err="1">
+                <a:effectLst/>
+                <a:latin typeface="Jost"/>
+              </a:rPr>
+              <a:t>setiap</a:t>
+            </a:r>
+            <a:r>
+              <a:rPr lang="en-GB" sz="3600" b="1" i="0" dirty="0">
+                <a:effectLst/>
+                <a:latin typeface="Jost"/>
+              </a:rPr>
+              <a:t> </a:t>
+            </a:r>
+            <a:r>
+              <a:rPr lang="en-GB" sz="3600" b="1" i="0" dirty="0" err="1">
+                <a:effectLst/>
+                <a:latin typeface="Jost"/>
+              </a:rPr>
+              <a:t>elemen</a:t>
+            </a:r>
+            <a:r>
+              <a:rPr lang="en-GB" sz="3600" b="1" i="0" dirty="0">
+                <a:effectLst/>
+                <a:latin typeface="Jost"/>
+              </a:rPr>
+              <a:t> di </a:t>
+            </a:r>
+            <a:r>
+              <a:rPr lang="en-GB" sz="3600" b="1" i="0" dirty="0" err="1">
+                <a:effectLst/>
+                <a:latin typeface="Jost"/>
+              </a:rPr>
+              <a:t>dalam</a:t>
+            </a:r>
+            <a:r>
+              <a:rPr lang="en-GB" sz="3600" b="1" i="0" dirty="0">
+                <a:effectLst/>
+                <a:latin typeface="Jost"/>
+              </a:rPr>
+              <a:t> list </a:t>
+            </a:r>
+            <a:r>
+              <a:rPr lang="en-GB" sz="3600" b="1" i="0" dirty="0" err="1">
+                <a:effectLst/>
+                <a:latin typeface="Jost"/>
+              </a:rPr>
+              <a:t>tersebut</a:t>
+            </a:r>
+            <a:r>
+              <a:rPr lang="en-GB" sz="3600" b="1" i="0" dirty="0">
+                <a:effectLst/>
+                <a:latin typeface="Jost"/>
+              </a:rPr>
+              <a:t> dan </a:t>
+            </a:r>
+            <a:r>
+              <a:rPr lang="en-GB" sz="3600" b="1" i="0" dirty="0" err="1">
+                <a:effectLst/>
+                <a:latin typeface="Jost"/>
+              </a:rPr>
+              <a:t>menampungnya</a:t>
+            </a:r>
+            <a:r>
+              <a:rPr lang="en-GB" sz="3600" b="1" i="0" dirty="0">
+                <a:effectLst/>
+                <a:latin typeface="Jost"/>
+              </a:rPr>
+              <a:t> </a:t>
+            </a:r>
+            <a:r>
+              <a:rPr lang="en-GB" sz="3600" b="1" i="0" dirty="0" err="1">
+                <a:effectLst/>
+                <a:latin typeface="Jost"/>
+              </a:rPr>
+              <a:t>ke</a:t>
+            </a:r>
+            <a:r>
+              <a:rPr lang="en-GB" sz="3600" b="1" i="0" dirty="0">
+                <a:effectLst/>
+                <a:latin typeface="Jost"/>
+              </a:rPr>
+              <a:t> </a:t>
+            </a:r>
+            <a:r>
+              <a:rPr lang="en-GB" sz="3600" b="1" i="0" dirty="0" err="1">
+                <a:effectLst/>
+                <a:latin typeface="Jost"/>
+              </a:rPr>
+              <a:t>dalam</a:t>
+            </a:r>
+            <a:r>
+              <a:rPr lang="en-GB" sz="3600" b="1" i="0" dirty="0">
+                <a:effectLst/>
+                <a:latin typeface="Jost"/>
+              </a:rPr>
+              <a:t> variable.</a:t>
+            </a:r>
+            <a:endParaRPr lang="en-GB" sz="3600" b="1" dirty="0">
+              <a:solidFill>
+                <a:schemeClr val="accent2">
+                  <a:lumMod val="75000"/>
+                </a:schemeClr>
+              </a:solidFill>
+            </a:endParaRPr>
+          </a:p>
+        </p:txBody>
+      </p:sp>
+      <p:sp>
+        <p:nvSpPr>
+          <p:cNvPr id="7" name="TextBox 6">
+            <a:extLst>
+              <a:ext uri="{FF2B5EF4-FFF2-40B4-BE49-F238E27FC236}">
+                <a16:creationId xmlns:a16="http://schemas.microsoft.com/office/drawing/2014/main" id="{CCF6910A-0E94-49CE-B0E5-933CE1E2E3D4}"/>
+              </a:ext>
+            </a:extLst>
+          </p:cNvPr>
+          <p:cNvSpPr txBox="1"/>
+          <p:nvPr/>
+        </p:nvSpPr>
+        <p:spPr>
+          <a:xfrm>
+            <a:off x="211016" y="6316393"/>
+            <a:ext cx="1378633" cy="369332"/>
+          </a:xfrm>
+          <a:prstGeom prst="rect">
+            <a:avLst/>
+          </a:prstGeom>
+          <a:noFill/>
+        </p:spPr>
+        <p:txBody>
+          <a:bodyPr wrap="square" rtlCol="0">
+            <a:spAutoFit/>
+          </a:bodyPr>
+          <a:lstStyle/>
+          <a:p>
+            <a:r>
+              <a:rPr lang="en-US" b="1" dirty="0" err="1"/>
+              <a:t>AslanAsilon</a:t>
+            </a:r>
+            <a:endParaRPr lang="en-GB" b="1" dirty="0"/>
+          </a:p>
+        </p:txBody>
+      </p:sp>
+    </p:spTree>
+    <p:extLst>
+      <p:ext uri="{BB962C8B-B14F-4D97-AF65-F5344CB8AC3E}">
+        <p14:creationId xmlns:p14="http://schemas.microsoft.com/office/powerpoint/2010/main" val="3407686473"/>
+      </p:ext>
+    </p:extLst>
+  </p:cSld>
+  <p:clrMapOvr>
+    <a:masterClrMapping/>
+  </p:clrMapOvr>
+</p:sld>
+</file>
+
 <file path=ppt/theme/theme1.xml><?xml version="1.0" encoding="utf-8"?>
 <a:theme xmlns:a="http://schemas.openxmlformats.org/drawingml/2006/main" name="Office Theme">
   <a:themeElements>

</xml_diff>